<commit_message>
Increase presentation font size
</commit_message>
<xml_diff>
--- a/Final Presentation Tucker-Spencer.pptx
+++ b/Final Presentation Tucker-Spencer.pptx
@@ -115,6 +115,11 @@
       </a:defRPr>
     </a:lvl9pPr>
   </p:defaultTextStyle>
+  <p:extLst>
+    <p:ext uri="{EFAFB233-063F-42B5-8137-9DF3F51BA10A}">
+      <p15:sldGuideLst xmlns:p15="http://schemas.microsoft.com/office/powerpoint/2012/main"/>
+    </p:ext>
+  </p:extLst>
 </p:presentation>
 </file>
 
@@ -200,7 +205,7 @@
           <a:p>
             <a:fld id="{E70A1813-9DCC-4C27-B980-1E5DBF7BB235}" type="datetimeFigureOut">
               <a:rPr lang="en-US" smtClean="0"/>
-              <a:t>12/5/2022</a:t>
+              <a:t>12/8/2022</a:t>
             </a:fld>
             <a:endParaRPr lang="en-US"/>
           </a:p>
@@ -1141,7 +1146,7 @@
           <a:p>
             <a:fld id="{0E676008-19E2-4D1F-B286-E05FDC5B8CAF}" type="datetimeFigureOut">
               <a:rPr lang="en-US" smtClean="0"/>
-              <a:t>12/5/2022</a:t>
+              <a:t>12/8/2022</a:t>
             </a:fld>
             <a:endParaRPr lang="en-US"/>
           </a:p>
@@ -1369,7 +1374,7 @@
           <a:p>
             <a:fld id="{0E676008-19E2-4D1F-B286-E05FDC5B8CAF}" type="datetimeFigureOut">
               <a:rPr lang="en-US" smtClean="0"/>
-              <a:t>12/5/2022</a:t>
+              <a:t>12/8/2022</a:t>
             </a:fld>
             <a:endParaRPr lang="en-US"/>
           </a:p>
@@ -1549,7 +1554,7 @@
           <a:p>
             <a:fld id="{0E676008-19E2-4D1F-B286-E05FDC5B8CAF}" type="datetimeFigureOut">
               <a:rPr lang="en-US" smtClean="0"/>
-              <a:t>12/5/2022</a:t>
+              <a:t>12/8/2022</a:t>
             </a:fld>
             <a:endParaRPr lang="en-US"/>
           </a:p>
@@ -1719,7 +1724,7 @@
           <a:p>
             <a:fld id="{0E676008-19E2-4D1F-B286-E05FDC5B8CAF}" type="datetimeFigureOut">
               <a:rPr lang="en-US" smtClean="0"/>
-              <a:t>12/5/2022</a:t>
+              <a:t>12/8/2022</a:t>
             </a:fld>
             <a:endParaRPr lang="en-US"/>
           </a:p>
@@ -1973,7 +1978,7 @@
           <a:p>
             <a:fld id="{0E676008-19E2-4D1F-B286-E05FDC5B8CAF}" type="datetimeFigureOut">
               <a:rPr lang="en-US" smtClean="0"/>
-              <a:t>12/5/2022</a:t>
+              <a:t>12/8/2022</a:t>
             </a:fld>
             <a:endParaRPr lang="en-US"/>
           </a:p>
@@ -2299,7 +2304,7 @@
           <a:p>
             <a:fld id="{0E676008-19E2-4D1F-B286-E05FDC5B8CAF}" type="datetimeFigureOut">
               <a:rPr lang="en-US" smtClean="0"/>
-              <a:t>12/5/2022</a:t>
+              <a:t>12/8/2022</a:t>
             </a:fld>
             <a:endParaRPr lang="en-US"/>
           </a:p>
@@ -2750,7 +2755,7 @@
           <a:p>
             <a:fld id="{0E676008-19E2-4D1F-B286-E05FDC5B8CAF}" type="datetimeFigureOut">
               <a:rPr lang="en-US" smtClean="0"/>
-              <a:t>12/5/2022</a:t>
+              <a:t>12/8/2022</a:t>
             </a:fld>
             <a:endParaRPr lang="en-US"/>
           </a:p>
@@ -2868,7 +2873,7 @@
           <a:p>
             <a:fld id="{0E676008-19E2-4D1F-B286-E05FDC5B8CAF}" type="datetimeFigureOut">
               <a:rPr lang="en-US" smtClean="0"/>
-              <a:t>12/5/2022</a:t>
+              <a:t>12/8/2022</a:t>
             </a:fld>
             <a:endParaRPr lang="en-US"/>
           </a:p>
@@ -2963,7 +2968,7 @@
           <a:p>
             <a:fld id="{0E676008-19E2-4D1F-B286-E05FDC5B8CAF}" type="datetimeFigureOut">
               <a:rPr lang="en-US" smtClean="0"/>
-              <a:t>12/5/2022</a:t>
+              <a:t>12/8/2022</a:t>
             </a:fld>
             <a:endParaRPr lang="en-US"/>
           </a:p>
@@ -3250,7 +3255,7 @@
           <a:p>
             <a:fld id="{0E676008-19E2-4D1F-B286-E05FDC5B8CAF}" type="datetimeFigureOut">
               <a:rPr lang="en-US" smtClean="0"/>
-              <a:t>12/5/2022</a:t>
+              <a:t>12/8/2022</a:t>
             </a:fld>
             <a:endParaRPr lang="en-US"/>
           </a:p>
@@ -3572,7 +3577,7 @@
           <a:p>
             <a:fld id="{0E676008-19E2-4D1F-B286-E05FDC5B8CAF}" type="datetimeFigureOut">
               <a:rPr lang="en-US" smtClean="0"/>
-              <a:t>12/5/2022</a:t>
+              <a:t>12/8/2022</a:t>
             </a:fld>
             <a:endParaRPr lang="en-US"/>
           </a:p>
@@ -3826,7 +3831,7 @@
           <a:p>
             <a:fld id="{0E676008-19E2-4D1F-B286-E05FDC5B8CAF}" type="datetimeFigureOut">
               <a:rPr lang="en-US" smtClean="0"/>
-              <a:t>12/5/2022</a:t>
+              <a:t>12/8/2022</a:t>
             </a:fld>
             <a:endParaRPr lang="en-US"/>
           </a:p>
@@ -4332,11 +4337,13 @@
         </p:nvSpPr>
         <p:spPr/>
         <p:txBody>
-          <a:bodyPr/>
-          <a:lstStyle/>
-          <a:p>
-            <a:r>
-              <a:rPr lang="en-US" dirty="0">
+          <a:bodyPr>
+            <a:normAutofit/>
+          </a:bodyPr>
+          <a:lstStyle/>
+          <a:p>
+            <a:r>
+              <a:rPr lang="en-US" sz="5400" dirty="0">
                 <a:latin typeface="Bahnschrift" panose="020B0502040204020203" pitchFamily="34" charset="0"/>
               </a:rPr>
               <a:t>Exploring Minecraft Shaders</a:t>
@@ -4362,11 +4369,13 @@
         </p:nvSpPr>
         <p:spPr/>
         <p:txBody>
-          <a:bodyPr/>
-          <a:lstStyle/>
-          <a:p>
-            <a:r>
-              <a:rPr lang="en-US" dirty="0">
+          <a:bodyPr>
+            <a:normAutofit/>
+          </a:bodyPr>
+          <a:lstStyle/>
+          <a:p>
+            <a:r>
+              <a:rPr lang="en-US" sz="2400" dirty="0">
                 <a:latin typeface="Bahnschrift" panose="020B0502040204020203" pitchFamily="34" charset="0"/>
               </a:rPr>
               <a:t>By Tucker &amp; Spencer</a:t>
@@ -4422,11 +4431,13 @@
         </p:nvSpPr>
         <p:spPr/>
         <p:txBody>
-          <a:bodyPr/>
-          <a:lstStyle/>
-          <a:p>
-            <a:r>
-              <a:rPr lang="en-US" dirty="0">
+          <a:bodyPr>
+            <a:normAutofit/>
+          </a:bodyPr>
+          <a:lstStyle/>
+          <a:p>
+            <a:r>
+              <a:rPr lang="en-US" sz="4800" dirty="0">
                 <a:latin typeface="Bahnschrift" panose="020B0502040204020203" pitchFamily="34" charset="0"/>
               </a:rPr>
               <a:t>Writing Minecraft Shaders</a:t>
@@ -4452,17 +4463,19 @@
         </p:nvSpPr>
         <p:spPr/>
         <p:txBody>
-          <a:bodyPr/>
-          <a:lstStyle/>
-          <a:p>
-            <a:r>
-              <a:rPr lang="en-US" b="1" dirty="0">
+          <a:bodyPr>
+            <a:normAutofit/>
+          </a:bodyPr>
+          <a:lstStyle/>
+          <a:p>
+            <a:r>
+              <a:rPr lang="en-US" sz="2400" b="1" dirty="0">
                 <a:latin typeface="Bahnschrift" panose="020B0502040204020203" pitchFamily="34" charset="0"/>
               </a:rPr>
               <a:t>Minecraft Java Edition </a:t>
             </a:r>
             <a:r>
-              <a:rPr lang="en-US" dirty="0">
+              <a:rPr lang="en-US" sz="2400" dirty="0">
                 <a:latin typeface="Bahnschrift" panose="020B0502040204020203" pitchFamily="34" charset="0"/>
               </a:rPr>
               <a:t>(1.19.2)</a:t>
@@ -4470,69 +4483,69 @@
           </a:p>
           <a:p>
             <a:r>
-              <a:rPr lang="en-US" b="1" dirty="0" err="1">
+              <a:rPr lang="en-US" sz="2400" b="1" dirty="0" err="1">
                 <a:latin typeface="Bahnschrift" panose="020B0502040204020203" pitchFamily="34" charset="0"/>
               </a:rPr>
               <a:t>MultiMC</a:t>
             </a:r>
             <a:r>
-              <a:rPr lang="en-US" dirty="0">
+              <a:rPr lang="en-US" sz="2400" dirty="0">
                 <a:latin typeface="Bahnschrift" panose="020B0502040204020203" pitchFamily="34" charset="0"/>
               </a:rPr>
               <a:t> third-party Minecraft launcher</a:t>
             </a:r>
             <a:br>
-              <a:rPr lang="en-US" dirty="0">
+              <a:rPr lang="en-US" sz="2400" dirty="0">
                 <a:latin typeface="Bahnschrift" panose="020B0502040204020203" pitchFamily="34" charset="0"/>
               </a:rPr>
             </a:br>
             <a:r>
-              <a:rPr lang="en-US" sz="1200" i="1" dirty="0">
+              <a:rPr lang="en-US" sz="1600" dirty="0">
                 <a:solidFill>
                   <a:schemeClr val="accent1"/>
                 </a:solidFill>
                 <a:latin typeface="Bahnschrift" panose="020B0502040204020203" pitchFamily="34" charset="0"/>
               </a:rPr>
-              <a:t>(adds easy mod management)</a:t>
-            </a:r>
-          </a:p>
-          <a:p>
-            <a:r>
-              <a:rPr lang="en-US" b="1" dirty="0" err="1">
+              <a:t>Adds easy mod management</a:t>
+            </a:r>
+          </a:p>
+          <a:p>
+            <a:r>
+              <a:rPr lang="en-US" sz="2400" b="1" dirty="0" err="1">
                 <a:latin typeface="Bahnschrift" panose="020B0502040204020203" pitchFamily="34" charset="0"/>
               </a:rPr>
               <a:t>Optifine</a:t>
             </a:r>
             <a:r>
-              <a:rPr lang="en-US" dirty="0">
+              <a:rPr lang="en-US" sz="2400" dirty="0">
                 <a:latin typeface="Bahnschrift" panose="020B0502040204020203" pitchFamily="34" charset="0"/>
               </a:rPr>
               <a:t> (H9) mod</a:t>
             </a:r>
             <a:br>
-              <a:rPr lang="en-US" dirty="0">
+              <a:rPr lang="en-US" sz="2400" dirty="0">
                 <a:latin typeface="Bahnschrift" panose="020B0502040204020203" pitchFamily="34" charset="0"/>
               </a:rPr>
             </a:br>
             <a:r>
-              <a:rPr lang="en-US" sz="1200" i="1" dirty="0">
+              <a:rPr lang="en-US" sz="1600" dirty="0">
                 <a:solidFill>
                   <a:schemeClr val="accent1"/>
                 </a:solidFill>
                 <a:latin typeface="Bahnschrift" panose="020B0502040204020203" pitchFamily="34" charset="0"/>
               </a:rPr>
-              <a:t>(adds shader support)</a:t>
-            </a:r>
-          </a:p>
-          <a:p>
-            <a:r>
-              <a:rPr lang="en-US" b="1" dirty="0">
+              <a:t>Adds shader support</a:t>
+            </a:r>
+          </a:p>
+          <a:p>
+            <a:r>
+              <a:rPr lang="en-US" sz="2400" b="1" dirty="0">
                 <a:latin typeface="Bahnschrift" panose="020B0502040204020203" pitchFamily="34" charset="0"/>
               </a:rPr>
               <a:t>GLSL</a:t>
             </a:r>
             <a:r>
-              <a:rPr lang="en-US" dirty="0">
+              <a:rPr lang="en-US" sz="2400" dirty="0">
                 <a:latin typeface="Bahnschrift" panose="020B0502040204020203" pitchFamily="34" charset="0"/>
               </a:rPr>
               <a:t> (2.1) shader files</a:t>
@@ -4540,24 +4553,24 @@
           </a:p>
           <a:p>
             <a:r>
-              <a:rPr lang="en-US" b="1" dirty="0">
+              <a:rPr lang="en-US" sz="2400" b="1" dirty="0">
                 <a:latin typeface="Bahnschrift" panose="020B0502040204020203" pitchFamily="34" charset="0"/>
               </a:rPr>
               <a:t>Tutorial</a:t>
             </a:r>
             <a:r>
-              <a:rPr lang="en-US" dirty="0">
+              <a:rPr lang="en-US" sz="2400" dirty="0">
                 <a:latin typeface="Bahnschrift" panose="020B0502040204020203" pitchFamily="34" charset="0"/>
               </a:rPr>
               <a:t> on basic diffuse lighting &amp; shadows</a:t>
             </a:r>
             <a:br>
-              <a:rPr lang="en-US" dirty="0">
+              <a:rPr lang="en-US" sz="2400" dirty="0">
                 <a:latin typeface="Bahnschrift" panose="020B0502040204020203" pitchFamily="34" charset="0"/>
               </a:rPr>
             </a:br>
             <a:r>
-              <a:rPr lang="en-US" sz="1200" dirty="0">
+              <a:rPr lang="en-US" sz="1600" dirty="0">
                 <a:solidFill>
                   <a:schemeClr val="accent1"/>
                 </a:solidFill>
@@ -4565,7 +4578,7 @@
               </a:rPr>
               <a:t>https://github.com/saada2006/MinecraftShaderProgramming</a:t>
             </a:r>
-            <a:endParaRPr lang="en-US" b="1" dirty="0">
+            <a:endParaRPr lang="en-US" sz="2400" b="1" dirty="0">
               <a:solidFill>
                 <a:schemeClr val="accent1"/>
               </a:solidFill>
@@ -4622,11 +4635,13 @@
         </p:nvSpPr>
         <p:spPr/>
         <p:txBody>
-          <a:bodyPr/>
-          <a:lstStyle/>
-          <a:p>
-            <a:r>
-              <a:rPr lang="en-US" dirty="0">
+          <a:bodyPr>
+            <a:normAutofit/>
+          </a:bodyPr>
+          <a:lstStyle/>
+          <a:p>
+            <a:r>
+              <a:rPr lang="en-US" sz="4800" dirty="0">
                 <a:latin typeface="Bahnschrift" panose="020B0502040204020203" pitchFamily="34" charset="0"/>
               </a:rPr>
               <a:t>Default Minecraft</a:t>
@@ -4670,11 +4685,13 @@
         </p:nvSpPr>
         <p:spPr/>
         <p:txBody>
-          <a:bodyPr/>
-          <a:lstStyle/>
-          <a:p>
-            <a:r>
-              <a:rPr lang="en-US" dirty="0">
+          <a:bodyPr>
+            <a:normAutofit/>
+          </a:bodyPr>
+          <a:lstStyle/>
+          <a:p>
+            <a:r>
+              <a:rPr lang="en-US" sz="2400" dirty="0">
                 <a:latin typeface="Bahnschrift" panose="020B0502040204020203" pitchFamily="34" charset="0"/>
               </a:rPr>
               <a:t>Nothing done here; Just a baseline for comparison</a:t>
@@ -4730,11 +4747,13 @@
         </p:nvSpPr>
         <p:spPr/>
         <p:txBody>
-          <a:bodyPr/>
-          <a:lstStyle/>
-          <a:p>
-            <a:r>
-              <a:rPr lang="en-US" dirty="0">
+          <a:bodyPr>
+            <a:normAutofit/>
+          </a:bodyPr>
+          <a:lstStyle/>
+          <a:p>
+            <a:r>
+              <a:rPr lang="en-US" sz="4800" dirty="0">
                 <a:latin typeface="Bahnschrift" panose="020B0502040204020203" pitchFamily="34" charset="0"/>
               </a:rPr>
               <a:t>Diffuse Lighting &amp; Shadows</a:t>
@@ -4778,11 +4797,13 @@
         </p:nvSpPr>
         <p:spPr/>
         <p:txBody>
-          <a:bodyPr/>
-          <a:lstStyle/>
-          <a:p>
-            <a:r>
-              <a:rPr lang="en-US" dirty="0">
+          <a:bodyPr>
+            <a:normAutofit/>
+          </a:bodyPr>
+          <a:lstStyle/>
+          <a:p>
+            <a:r>
+              <a:rPr lang="en-US" sz="2400" dirty="0">
                 <a:latin typeface="Bahnschrift" panose="020B0502040204020203" pitchFamily="34" charset="0"/>
               </a:rPr>
               <a:t>Based on the tutorial we followed</a:t>
@@ -4838,11 +4859,13 @@
         </p:nvSpPr>
         <p:spPr/>
         <p:txBody>
-          <a:bodyPr/>
-          <a:lstStyle/>
-          <a:p>
-            <a:r>
-              <a:rPr lang="en-US" dirty="0">
+          <a:bodyPr>
+            <a:normAutofit/>
+          </a:bodyPr>
+          <a:lstStyle/>
+          <a:p>
+            <a:r>
+              <a:rPr lang="en-US" sz="4800" dirty="0">
                 <a:latin typeface="Bahnschrift" panose="020B0502040204020203" pitchFamily="34" charset="0"/>
               </a:rPr>
               <a:t>Gameboy</a:t>
@@ -4886,11 +4909,13 @@
         </p:nvSpPr>
         <p:spPr/>
         <p:txBody>
-          <a:bodyPr/>
-          <a:lstStyle/>
-          <a:p>
-            <a:r>
-              <a:rPr lang="en-US" dirty="0">
+          <a:bodyPr>
+            <a:normAutofit/>
+          </a:bodyPr>
+          <a:lstStyle/>
+          <a:p>
+            <a:r>
+              <a:rPr lang="en-US" sz="2400" dirty="0">
                 <a:latin typeface="Bahnschrift" panose="020B0502040204020203" pitchFamily="34" charset="0"/>
               </a:rPr>
               <a:t>Made from scratch</a:t>
@@ -4946,11 +4971,13 @@
         </p:nvSpPr>
         <p:spPr/>
         <p:txBody>
-          <a:bodyPr/>
-          <a:lstStyle/>
-          <a:p>
-            <a:r>
-              <a:rPr lang="en-US" dirty="0">
+          <a:bodyPr>
+            <a:normAutofit/>
+          </a:bodyPr>
+          <a:lstStyle/>
+          <a:p>
+            <a:r>
+              <a:rPr lang="en-US" sz="4800" dirty="0">
                 <a:latin typeface="Bahnschrift" panose="020B0502040204020203" pitchFamily="34" charset="0"/>
               </a:rPr>
               <a:t>NES</a:t>
@@ -4994,11 +5021,13 @@
         </p:nvSpPr>
         <p:spPr/>
         <p:txBody>
-          <a:bodyPr/>
-          <a:lstStyle/>
-          <a:p>
-            <a:r>
-              <a:rPr lang="en-US" dirty="0">
+          <a:bodyPr>
+            <a:normAutofit/>
+          </a:bodyPr>
+          <a:lstStyle/>
+          <a:p>
+            <a:r>
+              <a:rPr lang="en-US" sz="2400" dirty="0">
                 <a:latin typeface="Bahnschrift" panose="020B0502040204020203" pitchFamily="34" charset="0"/>
               </a:rPr>
               <a:t>Made from scratch</a:t>
@@ -5054,11 +5083,13 @@
         </p:nvSpPr>
         <p:spPr/>
         <p:txBody>
-          <a:bodyPr/>
-          <a:lstStyle/>
-          <a:p>
-            <a:r>
-              <a:rPr lang="en-US" dirty="0">
+          <a:bodyPr>
+            <a:normAutofit/>
+          </a:bodyPr>
+          <a:lstStyle/>
+          <a:p>
+            <a:r>
+              <a:rPr lang="en-US" sz="4800" dirty="0">
                 <a:latin typeface="Bahnschrift" panose="020B0502040204020203" pitchFamily="34" charset="0"/>
               </a:rPr>
               <a:t>Atari 2600 NTSC</a:t>
@@ -5102,11 +5133,13 @@
         </p:nvSpPr>
         <p:spPr/>
         <p:txBody>
-          <a:bodyPr/>
-          <a:lstStyle/>
-          <a:p>
-            <a:r>
-              <a:rPr lang="en-US" dirty="0">
+          <a:bodyPr>
+            <a:normAutofit/>
+          </a:bodyPr>
+          <a:lstStyle/>
+          <a:p>
+            <a:r>
+              <a:rPr lang="en-US" sz="2400" dirty="0">
                 <a:latin typeface="Bahnschrift" panose="020B0502040204020203" pitchFamily="34" charset="0"/>
               </a:rPr>
               <a:t>Made from scratch</a:t>
@@ -5162,11 +5195,13 @@
         </p:nvSpPr>
         <p:spPr/>
         <p:txBody>
-          <a:bodyPr/>
-          <a:lstStyle/>
-          <a:p>
-            <a:r>
-              <a:rPr lang="en-US" dirty="0">
+          <a:bodyPr>
+            <a:normAutofit/>
+          </a:bodyPr>
+          <a:lstStyle/>
+          <a:p>
+            <a:r>
+              <a:rPr lang="en-US" sz="4800" dirty="0">
                 <a:latin typeface="Bahnschrift" panose="020B0502040204020203" pitchFamily="34" charset="0"/>
               </a:rPr>
               <a:t>Skybox</a:t>
@@ -5210,11 +5245,13 @@
         </p:nvSpPr>
         <p:spPr/>
         <p:txBody>
-          <a:bodyPr/>
-          <a:lstStyle/>
-          <a:p>
-            <a:r>
-              <a:rPr lang="en-US" dirty="0">
+          <a:bodyPr>
+            <a:normAutofit/>
+          </a:bodyPr>
+          <a:lstStyle/>
+          <a:p>
+            <a:r>
+              <a:rPr lang="en-US" sz="2400" dirty="0">
                 <a:latin typeface="Bahnschrift" panose="020B0502040204020203" pitchFamily="34" charset="0"/>
               </a:rPr>
               <a:t>Made from scratch</a:t>
@@ -5270,11 +5307,13 @@
         </p:nvSpPr>
         <p:spPr/>
         <p:txBody>
-          <a:bodyPr/>
-          <a:lstStyle/>
-          <a:p>
-            <a:r>
-              <a:rPr lang="en-US" dirty="0">
+          <a:bodyPr>
+            <a:normAutofit/>
+          </a:bodyPr>
+          <a:lstStyle/>
+          <a:p>
+            <a:r>
+              <a:rPr lang="en-US" sz="4800" dirty="0">
                 <a:latin typeface="Bahnschrift" panose="020B0502040204020203" pitchFamily="34" charset="0"/>
               </a:rPr>
               <a:t>World Curvature</a:t>
@@ -5318,11 +5357,13 @@
         </p:nvSpPr>
         <p:spPr/>
         <p:txBody>
-          <a:bodyPr/>
-          <a:lstStyle/>
-          <a:p>
-            <a:r>
-              <a:rPr lang="en-US" dirty="0">
+          <a:bodyPr>
+            <a:normAutofit/>
+          </a:bodyPr>
+          <a:lstStyle/>
+          <a:p>
+            <a:r>
+              <a:rPr lang="en-US" sz="2400" dirty="0">
                 <a:latin typeface="Bahnschrift" panose="020B0502040204020203" pitchFamily="34" charset="0"/>
               </a:rPr>
               <a:t>Inspired by a setting in BSL shaders for Minecraft</a:t>

</xml_diff>

<commit_message>
Powerpoint and readme update
</commit_message>
<xml_diff>
--- a/Final Presentation Tucker-Spencer.pptx
+++ b/Final Presentation Tucker-Spencer.pptx
@@ -5,7 +5,7 @@
     <p:sldMasterId id="2147483708" r:id="rId1"/>
   </p:sldMasterIdLst>
   <p:notesMasterIdLst>
-    <p:notesMasterId r:id="rId11"/>
+    <p:notesMasterId r:id="rId12"/>
   </p:notesMasterIdLst>
   <p:sldIdLst>
     <p:sldId id="256" r:id="rId2"/>
@@ -17,6 +17,7 @@
     <p:sldId id="263" r:id="rId8"/>
     <p:sldId id="259" r:id="rId9"/>
     <p:sldId id="260" r:id="rId10"/>
+    <p:sldId id="265" r:id="rId11"/>
   </p:sldIdLst>
   <p:sldSz cx="12192000" cy="6858000"/>
   <p:notesSz cx="6858000" cy="9144000"/>
@@ -524,13 +525,8 @@
           <a:p>
             <a:r>
               <a:rPr lang="en-US" dirty="0"/>
-              <a:t>No shadows or </a:t>
-            </a:r>
-            <a:r>
-              <a:rPr lang="en-US"/>
-              <a:t>diffuse lighting.</a:t>
-            </a:r>
-            <a:endParaRPr lang="en-US" dirty="0"/>
+              <a:t>No shadows or diffuse lighting.</a:t>
+            </a:r>
           </a:p>
           <a:p>
             <a:r>
@@ -4396,6 +4392,100 @@
 </p:sld>
 </file>
 
+<file path=ppt/slides/slide10.xml><?xml version="1.0" encoding="utf-8"?>
+<p:sld xmlns:a="http://schemas.openxmlformats.org/drawingml/2006/main" xmlns:r="http://schemas.openxmlformats.org/officeDocument/2006/relationships" xmlns:p="http://schemas.openxmlformats.org/presentationml/2006/main">
+  <p:cSld>
+    <p:spTree>
+      <p:nvGrpSpPr>
+        <p:cNvPr id="1" name=""/>
+        <p:cNvGrpSpPr/>
+        <p:nvPr/>
+      </p:nvGrpSpPr>
+      <p:grpSpPr>
+        <a:xfrm>
+          <a:off x="0" y="0"/>
+          <a:ext cx="0" cy="0"/>
+          <a:chOff x="0" y="0"/>
+          <a:chExt cx="0" cy="0"/>
+        </a:xfrm>
+      </p:grpSpPr>
+      <p:sp>
+        <p:nvSpPr>
+          <p:cNvPr id="2" name="Title 1">
+            <a:extLst>
+              <a:ext uri="{FF2B5EF4-FFF2-40B4-BE49-F238E27FC236}">
+                <a16:creationId xmlns:a16="http://schemas.microsoft.com/office/drawing/2014/main" id="{ADFAB2EE-B836-0147-0A12-0DEB2F8F3B07}"/>
+              </a:ext>
+            </a:extLst>
+          </p:cNvPr>
+          <p:cNvSpPr>
+            <a:spLocks noGrp="1"/>
+          </p:cNvSpPr>
+          <p:nvPr>
+            <p:ph type="title"/>
+          </p:nvPr>
+        </p:nvSpPr>
+        <p:spPr/>
+        <p:txBody>
+          <a:bodyPr>
+            <a:normAutofit/>
+          </a:bodyPr>
+          <a:lstStyle/>
+          <a:p>
+            <a:r>
+              <a:rPr lang="en-US" sz="4800" dirty="0">
+                <a:latin typeface="Bahnschrift" panose="020B0502040204020203" pitchFamily="34" charset="0"/>
+              </a:rPr>
+              <a:t>Optimizations</a:t>
+            </a:r>
+          </a:p>
+        </p:txBody>
+      </p:sp>
+      <p:sp>
+        <p:nvSpPr>
+          <p:cNvPr id="3" name="Content Placeholder 2">
+            <a:extLst>
+              <a:ext uri="{FF2B5EF4-FFF2-40B4-BE49-F238E27FC236}">
+                <a16:creationId xmlns:a16="http://schemas.microsoft.com/office/drawing/2014/main" id="{0265484F-627C-AFCC-CC42-17B6F157CC64}"/>
+              </a:ext>
+            </a:extLst>
+          </p:cNvPr>
+          <p:cNvSpPr>
+            <a:spLocks noGrp="1"/>
+          </p:cNvSpPr>
+          <p:nvPr>
+            <p:ph idx="1"/>
+          </p:nvPr>
+        </p:nvSpPr>
+        <p:spPr/>
+        <p:txBody>
+          <a:bodyPr>
+            <a:normAutofit/>
+          </a:bodyPr>
+          <a:lstStyle/>
+          <a:p>
+            <a:endParaRPr lang="en-US" sz="2400" b="1" dirty="0">
+              <a:solidFill>
+                <a:schemeClr val="accent1"/>
+              </a:solidFill>
+              <a:latin typeface="Bahnschrift" panose="020B0502040204020203" pitchFamily="34" charset="0"/>
+            </a:endParaRPr>
+          </a:p>
+        </p:txBody>
+      </p:sp>
+    </p:spTree>
+    <p:extLst>
+      <p:ext uri="{BB962C8B-B14F-4D97-AF65-F5344CB8AC3E}">
+        <p14:creationId xmlns:p14="http://schemas.microsoft.com/office/powerpoint/2010/main" val="265293387"/>
+      </p:ext>
+    </p:extLst>
+  </p:cSld>
+  <p:clrMapOvr>
+    <a:masterClrMapping/>
+  </p:clrMapOvr>
+</p:sld>
+</file>
+
 <file path=ppt/slides/slide2.xml><?xml version="1.0" encoding="utf-8"?>
 <p:sld xmlns:a="http://schemas.openxmlformats.org/drawingml/2006/main" xmlns:r="http://schemas.openxmlformats.org/officeDocument/2006/relationships" xmlns:p="http://schemas.openxmlformats.org/presentationml/2006/main">
   <p:cSld>
@@ -4578,12 +4668,54 @@
               </a:rPr>
               <a:t>https://github.com/saada2006/MinecraftShaderProgramming</a:t>
             </a:r>
-            <a:endParaRPr lang="en-US" sz="2400" b="1" dirty="0">
+            <a:br>
+              <a:rPr lang="en-US" sz="1600" dirty="0">
+                <a:solidFill>
+                  <a:schemeClr val="accent1"/>
+                </a:solidFill>
+                <a:latin typeface="Bahnschrift" panose="020B0502040204020203" pitchFamily="34" charset="0"/>
+              </a:rPr>
+            </a:br>
+            <a:endParaRPr lang="en-US" sz="1600" dirty="0">
               <a:solidFill>
                 <a:schemeClr val="accent1"/>
               </a:solidFill>
               <a:latin typeface="Bahnschrift" panose="020B0502040204020203" pitchFamily="34" charset="0"/>
             </a:endParaRPr>
+          </a:p>
+          <a:p>
+            <a:r>
+              <a:rPr lang="en-US" sz="2400" dirty="0">
+                <a:latin typeface="Bahnschrift" panose="020B0502040204020203" pitchFamily="34" charset="0"/>
+              </a:rPr>
+              <a:t>See our </a:t>
+            </a:r>
+            <a:r>
+              <a:rPr lang="en-US" sz="2400" b="1" dirty="0" err="1">
+                <a:latin typeface="Bahnschrift" panose="020B0502040204020203" pitchFamily="34" charset="0"/>
+              </a:rPr>
+              <a:t>Github</a:t>
+            </a:r>
+            <a:r>
+              <a:rPr lang="en-US" sz="2400" dirty="0">
+                <a:latin typeface="Bahnschrift" panose="020B0502040204020203" pitchFamily="34" charset="0"/>
+              </a:rPr>
+              <a:t> repository for more details…</a:t>
+            </a:r>
+            <a:br>
+              <a:rPr lang="en-US" sz="2400" b="1" i="1" dirty="0">
+                <a:latin typeface="Bahnschrift" panose="020B0502040204020203" pitchFamily="34" charset="0"/>
+              </a:rPr>
+            </a:br>
+            <a:r>
+              <a:rPr lang="en-US" sz="1600" dirty="0">
+                <a:solidFill>
+                  <a:schemeClr val="accent1"/>
+                </a:solidFill>
+                <a:latin typeface="Bahnschrift" panose="020B0502040204020203" pitchFamily="34" charset="0"/>
+              </a:rPr>
+              <a:t>https://github.com/sandint2011/mc-shader-exploration</a:t>
+            </a:r>
           </a:p>
         </p:txBody>
       </p:sp>

</xml_diff>

<commit_message>
Update powerpoint and readme with entity lighting fix
</commit_message>
<xml_diff>
--- a/Final Presentation Tucker-Spencer.pptx
+++ b/Final Presentation Tucker-Spencer.pptx
@@ -643,6 +643,12 @@
             <a:r>
               <a:rPr lang="en-US" dirty="0"/>
               <a:t>Transparent and colored shadows.</a:t>
+            </a:r>
+          </a:p>
+          <a:p>
+            <a:r>
+              <a:rPr lang="en-US" dirty="0"/>
+              <a:t>Apply lighting to entities as well.</a:t>
             </a:r>
           </a:p>
         </p:txBody>
@@ -4938,7 +4944,7 @@
               <a:rPr lang="en-US" sz="2400" dirty="0">
                 <a:latin typeface="Bahnschrift" panose="020B0502040204020203" pitchFamily="34" charset="0"/>
               </a:rPr>
-              <a:t>Based on the tutorial we followed</a:t>
+              <a:t>Expanded on the tutorial we followed</a:t>
             </a:r>
           </a:p>
         </p:txBody>

</xml_diff>

<commit_message>
Update Final Presentation Tucker-Spencer.pptx
</commit_message>
<xml_diff>
--- a/Final Presentation Tucker-Spencer.pptx
+++ b/Final Presentation Tucker-Spencer.pptx
@@ -650,6 +650,17 @@
               <a:rPr lang="en-US" dirty="0"/>
               <a:t>Apply lighting to entities as well.</a:t>
             </a:r>
+          </a:p>
+          <a:p>
+            <a:r>
+              <a:rPr lang="en-US" dirty="0"/>
+              <a:t>Sky light-level adjusted </a:t>
+            </a:r>
+            <a:r>
+              <a:rPr lang="en-US"/>
+              <a:t>ambient lighting.</a:t>
+            </a:r>
+            <a:endParaRPr lang="en-US" dirty="0"/>
           </a:p>
         </p:txBody>
       </p:sp>

</xml_diff>

<commit_message>
Reorganize PowerPoint slide order
</commit_message>
<xml_diff>
--- a/Final Presentation Tucker-Spencer.pptx
+++ b/Final Presentation Tucker-Spencer.pptx
@@ -5,19 +5,18 @@
     <p:sldMasterId id="2147483708" r:id="rId1"/>
   </p:sldMasterIdLst>
   <p:notesMasterIdLst>
-    <p:notesMasterId r:id="rId12"/>
+    <p:notesMasterId r:id="rId11"/>
   </p:notesMasterIdLst>
   <p:sldIdLst>
     <p:sldId id="256" r:id="rId2"/>
     <p:sldId id="261" r:id="rId3"/>
     <p:sldId id="258" r:id="rId4"/>
     <p:sldId id="264" r:id="rId5"/>
-    <p:sldId id="257" r:id="rId6"/>
-    <p:sldId id="262" r:id="rId7"/>
-    <p:sldId id="263" r:id="rId8"/>
-    <p:sldId id="259" r:id="rId9"/>
-    <p:sldId id="260" r:id="rId10"/>
-    <p:sldId id="265" r:id="rId11"/>
+    <p:sldId id="260" r:id="rId6"/>
+    <p:sldId id="257" r:id="rId7"/>
+    <p:sldId id="262" r:id="rId8"/>
+    <p:sldId id="263" r:id="rId9"/>
+    <p:sldId id="265" r:id="rId10"/>
   </p:sldIdLst>
   <p:sldSz cx="12192000" cy="6858000"/>
   <p:notesSz cx="6858000" cy="9144000"/>
@@ -206,7 +205,7 @@
           <a:p>
             <a:fld id="{E70A1813-9DCC-4C27-B980-1E5DBF7BB235}" type="datetimeFigureOut">
               <a:rPr lang="en-US" smtClean="0"/>
-              <a:t>12/8/2022</a:t>
+              <a:t>12/9/2022</a:t>
             </a:fld>
             <a:endParaRPr lang="en-US"/>
           </a:p>
@@ -624,12 +623,6 @@
           <a:p>
             <a:r>
               <a:rPr lang="en-US" dirty="0"/>
-              <a:t>Ambient lighting.</a:t>
-            </a:r>
-          </a:p>
-          <a:p>
-            <a:r>
-              <a:rPr lang="en-US" dirty="0"/>
               <a:t>Shadow casting.</a:t>
             </a:r>
           </a:p>
@@ -654,13 +647,8 @@
           <a:p>
             <a:r>
               <a:rPr lang="en-US" dirty="0"/>
-              <a:t>Sky light-level adjusted </a:t>
-            </a:r>
-            <a:r>
-              <a:rPr lang="en-US"/>
-              <a:t>ambient lighting.</a:t>
-            </a:r>
-            <a:endParaRPr lang="en-US" dirty="0"/>
+              <a:t>Sky light-level adjusted ambient lighting.</a:t>
+            </a:r>
           </a:p>
         </p:txBody>
       </p:sp>
@@ -746,23 +734,8 @@
           <a:p>
             <a:r>
               <a:rPr lang="en-US" dirty="0"/>
-              <a:t>Color limitation to 4 colors (7).</a:t>
-            </a:r>
-          </a:p>
-          <a:p>
-            <a:r>
-              <a:rPr lang="en-US" dirty="0"/>
-              <a:t>Dithering.</a:t>
-            </a:r>
-          </a:p>
-          <a:p>
-            <a:r>
-              <a:rPr lang="en-US" dirty="0"/>
-              <a:t>Pixelation (4x).</a:t>
-            </a:r>
-          </a:p>
-          <a:p>
-            <a:endParaRPr lang="en-US" dirty="0"/>
+              <a:t>Vertex shader for terrain/entities to curve like the Earth.</a:t>
+            </a:r>
           </a:p>
         </p:txBody>
       </p:sp>
@@ -792,7 +765,7 @@
     </p:spTree>
     <p:extLst>
       <p:ext uri="{BB962C8B-B14F-4D97-AF65-F5344CB8AC3E}">
-        <p14:creationId xmlns:p14="http://schemas.microsoft.com/office/powerpoint/2010/main" val="2728214893"/>
+        <p14:creationId xmlns:p14="http://schemas.microsoft.com/office/powerpoint/2010/main" val="2056557438"/>
       </p:ext>
     </p:extLst>
   </p:cSld>
@@ -848,7 +821,13 @@
           <a:p>
             <a:r>
               <a:rPr lang="en-US" dirty="0"/>
-              <a:t>Color limitation to 54 colors.</a:t>
+              <a:t>Color limitation to 4 colors (7).</a:t>
+            </a:r>
+          </a:p>
+          <a:p>
+            <a:r>
+              <a:rPr lang="en-US" dirty="0"/>
+              <a:t>Dithering.</a:t>
             </a:r>
           </a:p>
           <a:p>
@@ -856,6 +835,9 @@
               <a:rPr lang="en-US" dirty="0"/>
               <a:t>Pixelation (4x).</a:t>
             </a:r>
+          </a:p>
+          <a:p>
+            <a:endParaRPr lang="en-US" dirty="0"/>
           </a:p>
         </p:txBody>
       </p:sp>
@@ -885,7 +867,7 @@
     </p:spTree>
     <p:extLst>
       <p:ext uri="{BB962C8B-B14F-4D97-AF65-F5344CB8AC3E}">
-        <p14:creationId xmlns:p14="http://schemas.microsoft.com/office/powerpoint/2010/main" val="4278284954"/>
+        <p14:creationId xmlns:p14="http://schemas.microsoft.com/office/powerpoint/2010/main" val="2728214893"/>
       </p:ext>
     </p:extLst>
   </p:cSld>
@@ -941,7 +923,7 @@
           <a:p>
             <a:r>
               <a:rPr lang="en-US" dirty="0"/>
-              <a:t>Color limitation to128 colors.</a:t>
+              <a:t>Color limitation to 54 colors.</a:t>
             </a:r>
           </a:p>
           <a:p>
@@ -949,9 +931,6 @@
               <a:rPr lang="en-US" dirty="0"/>
               <a:t>Pixelation (4x).</a:t>
             </a:r>
-          </a:p>
-          <a:p>
-            <a:endParaRPr lang="en-US" dirty="0"/>
           </a:p>
         </p:txBody>
       </p:sp>
@@ -973,6 +952,102 @@
             <a:fld id="{E6EAA4FA-9292-4C4C-ABA1-E0FA9C71A060}" type="slidenum">
               <a:rPr lang="en-US" smtClean="0"/>
               <a:t>7</a:t>
+            </a:fld>
+            <a:endParaRPr lang="en-US"/>
+          </a:p>
+        </p:txBody>
+      </p:sp>
+    </p:spTree>
+    <p:extLst>
+      <p:ext uri="{BB962C8B-B14F-4D97-AF65-F5344CB8AC3E}">
+        <p14:creationId xmlns:p14="http://schemas.microsoft.com/office/powerpoint/2010/main" val="4278284954"/>
+      </p:ext>
+    </p:extLst>
+  </p:cSld>
+  <p:clrMapOvr>
+    <a:masterClrMapping/>
+  </p:clrMapOvr>
+</p:notes>
+</file>
+
+<file path=ppt/notesSlides/notesSlide6.xml><?xml version="1.0" encoding="utf-8"?>
+<p:notes xmlns:a="http://schemas.openxmlformats.org/drawingml/2006/main" xmlns:r="http://schemas.openxmlformats.org/officeDocument/2006/relationships" xmlns:p="http://schemas.openxmlformats.org/presentationml/2006/main">
+  <p:cSld>
+    <p:spTree>
+      <p:nvGrpSpPr>
+        <p:cNvPr id="1" name=""/>
+        <p:cNvGrpSpPr/>
+        <p:nvPr/>
+      </p:nvGrpSpPr>
+      <p:grpSpPr>
+        <a:xfrm>
+          <a:off x="0" y="0"/>
+          <a:ext cx="0" cy="0"/>
+          <a:chOff x="0" y="0"/>
+          <a:chExt cx="0" cy="0"/>
+        </a:xfrm>
+      </p:grpSpPr>
+      <p:sp>
+        <p:nvSpPr>
+          <p:cNvPr id="2" name="Slide Image Placeholder 1"/>
+          <p:cNvSpPr>
+            <a:spLocks noGrp="1" noRot="1" noChangeAspect="1"/>
+          </p:cNvSpPr>
+          <p:nvPr>
+            <p:ph type="sldImg"/>
+          </p:nvPr>
+        </p:nvSpPr>
+        <p:spPr/>
+      </p:sp>
+      <p:sp>
+        <p:nvSpPr>
+          <p:cNvPr id="3" name="Notes Placeholder 2"/>
+          <p:cNvSpPr>
+            <a:spLocks noGrp="1"/>
+          </p:cNvSpPr>
+          <p:nvPr>
+            <p:ph type="body" idx="1"/>
+          </p:nvPr>
+        </p:nvSpPr>
+        <p:spPr/>
+        <p:txBody>
+          <a:bodyPr/>
+          <a:lstStyle/>
+          <a:p>
+            <a:r>
+              <a:rPr lang="en-US" dirty="0"/>
+              <a:t>Color limitation to128 colors.</a:t>
+            </a:r>
+          </a:p>
+          <a:p>
+            <a:r>
+              <a:rPr lang="en-US" dirty="0"/>
+              <a:t>Pixelation (4x).</a:t>
+            </a:r>
+          </a:p>
+          <a:p>
+            <a:endParaRPr lang="en-US" dirty="0"/>
+          </a:p>
+        </p:txBody>
+      </p:sp>
+      <p:sp>
+        <p:nvSpPr>
+          <p:cNvPr id="4" name="Slide Number Placeholder 3"/>
+          <p:cNvSpPr>
+            <a:spLocks noGrp="1"/>
+          </p:cNvSpPr>
+          <p:nvPr>
+            <p:ph type="sldNum" sz="quarter" idx="5"/>
+          </p:nvPr>
+        </p:nvSpPr>
+        <p:spPr/>
+        <p:txBody>
+          <a:bodyPr/>
+          <a:lstStyle/>
+          <a:p>
+            <a:fld id="{E6EAA4FA-9292-4C4C-ABA1-E0FA9C71A060}" type="slidenum">
+              <a:rPr lang="en-US" smtClean="0"/>
+              <a:t>8</a:t>
             </a:fld>
             <a:endParaRPr lang="en-US"/>
           </a:p>
@@ -1159,7 +1234,7 @@
           <a:p>
             <a:fld id="{0E676008-19E2-4D1F-B286-E05FDC5B8CAF}" type="datetimeFigureOut">
               <a:rPr lang="en-US" smtClean="0"/>
-              <a:t>12/8/2022</a:t>
+              <a:t>12/9/2022</a:t>
             </a:fld>
             <a:endParaRPr lang="en-US"/>
           </a:p>
@@ -1387,7 +1462,7 @@
           <a:p>
             <a:fld id="{0E676008-19E2-4D1F-B286-E05FDC5B8CAF}" type="datetimeFigureOut">
               <a:rPr lang="en-US" smtClean="0"/>
-              <a:t>12/8/2022</a:t>
+              <a:t>12/9/2022</a:t>
             </a:fld>
             <a:endParaRPr lang="en-US"/>
           </a:p>
@@ -1567,7 +1642,7 @@
           <a:p>
             <a:fld id="{0E676008-19E2-4D1F-B286-E05FDC5B8CAF}" type="datetimeFigureOut">
               <a:rPr lang="en-US" smtClean="0"/>
-              <a:t>12/8/2022</a:t>
+              <a:t>12/9/2022</a:t>
             </a:fld>
             <a:endParaRPr lang="en-US"/>
           </a:p>
@@ -1737,7 +1812,7 @@
           <a:p>
             <a:fld id="{0E676008-19E2-4D1F-B286-E05FDC5B8CAF}" type="datetimeFigureOut">
               <a:rPr lang="en-US" smtClean="0"/>
-              <a:t>12/8/2022</a:t>
+              <a:t>12/9/2022</a:t>
             </a:fld>
             <a:endParaRPr lang="en-US"/>
           </a:p>
@@ -1991,7 +2066,7 @@
           <a:p>
             <a:fld id="{0E676008-19E2-4D1F-B286-E05FDC5B8CAF}" type="datetimeFigureOut">
               <a:rPr lang="en-US" smtClean="0"/>
-              <a:t>12/8/2022</a:t>
+              <a:t>12/9/2022</a:t>
             </a:fld>
             <a:endParaRPr lang="en-US"/>
           </a:p>
@@ -2317,7 +2392,7 @@
           <a:p>
             <a:fld id="{0E676008-19E2-4D1F-B286-E05FDC5B8CAF}" type="datetimeFigureOut">
               <a:rPr lang="en-US" smtClean="0"/>
-              <a:t>12/8/2022</a:t>
+              <a:t>12/9/2022</a:t>
             </a:fld>
             <a:endParaRPr lang="en-US"/>
           </a:p>
@@ -2768,7 +2843,7 @@
           <a:p>
             <a:fld id="{0E676008-19E2-4D1F-B286-E05FDC5B8CAF}" type="datetimeFigureOut">
               <a:rPr lang="en-US" smtClean="0"/>
-              <a:t>12/8/2022</a:t>
+              <a:t>12/9/2022</a:t>
             </a:fld>
             <a:endParaRPr lang="en-US"/>
           </a:p>
@@ -2886,7 +2961,7 @@
           <a:p>
             <a:fld id="{0E676008-19E2-4D1F-B286-E05FDC5B8CAF}" type="datetimeFigureOut">
               <a:rPr lang="en-US" smtClean="0"/>
-              <a:t>12/8/2022</a:t>
+              <a:t>12/9/2022</a:t>
             </a:fld>
             <a:endParaRPr lang="en-US"/>
           </a:p>
@@ -2981,7 +3056,7 @@
           <a:p>
             <a:fld id="{0E676008-19E2-4D1F-B286-E05FDC5B8CAF}" type="datetimeFigureOut">
               <a:rPr lang="en-US" smtClean="0"/>
-              <a:t>12/8/2022</a:t>
+              <a:t>12/9/2022</a:t>
             </a:fld>
             <a:endParaRPr lang="en-US"/>
           </a:p>
@@ -3268,7 +3343,7 @@
           <a:p>
             <a:fld id="{0E676008-19E2-4D1F-B286-E05FDC5B8CAF}" type="datetimeFigureOut">
               <a:rPr lang="en-US" smtClean="0"/>
-              <a:t>12/8/2022</a:t>
+              <a:t>12/9/2022</a:t>
             </a:fld>
             <a:endParaRPr lang="en-US"/>
           </a:p>
@@ -3590,7 +3665,7 @@
           <a:p>
             <a:fld id="{0E676008-19E2-4D1F-B286-E05FDC5B8CAF}" type="datetimeFigureOut">
               <a:rPr lang="en-US" smtClean="0"/>
-              <a:t>12/8/2022</a:t>
+              <a:t>12/9/2022</a:t>
             </a:fld>
             <a:endParaRPr lang="en-US"/>
           </a:p>
@@ -3844,7 +3919,7 @@
           <a:p>
             <a:fld id="{0E676008-19E2-4D1F-B286-E05FDC5B8CAF}" type="datetimeFigureOut">
               <a:rPr lang="en-US" smtClean="0"/>
-              <a:t>12/8/2022</a:t>
+              <a:t>12/9/2022</a:t>
             </a:fld>
             <a:endParaRPr lang="en-US"/>
           </a:p>
@@ -4409,100 +4484,6 @@
 </p:sld>
 </file>
 
-<file path=ppt/slides/slide10.xml><?xml version="1.0" encoding="utf-8"?>
-<p:sld xmlns:a="http://schemas.openxmlformats.org/drawingml/2006/main" xmlns:r="http://schemas.openxmlformats.org/officeDocument/2006/relationships" xmlns:p="http://schemas.openxmlformats.org/presentationml/2006/main">
-  <p:cSld>
-    <p:spTree>
-      <p:nvGrpSpPr>
-        <p:cNvPr id="1" name=""/>
-        <p:cNvGrpSpPr/>
-        <p:nvPr/>
-      </p:nvGrpSpPr>
-      <p:grpSpPr>
-        <a:xfrm>
-          <a:off x="0" y="0"/>
-          <a:ext cx="0" cy="0"/>
-          <a:chOff x="0" y="0"/>
-          <a:chExt cx="0" cy="0"/>
-        </a:xfrm>
-      </p:grpSpPr>
-      <p:sp>
-        <p:nvSpPr>
-          <p:cNvPr id="2" name="Title 1">
-            <a:extLst>
-              <a:ext uri="{FF2B5EF4-FFF2-40B4-BE49-F238E27FC236}">
-                <a16:creationId xmlns:a16="http://schemas.microsoft.com/office/drawing/2014/main" id="{ADFAB2EE-B836-0147-0A12-0DEB2F8F3B07}"/>
-              </a:ext>
-            </a:extLst>
-          </p:cNvPr>
-          <p:cNvSpPr>
-            <a:spLocks noGrp="1"/>
-          </p:cNvSpPr>
-          <p:nvPr>
-            <p:ph type="title"/>
-          </p:nvPr>
-        </p:nvSpPr>
-        <p:spPr/>
-        <p:txBody>
-          <a:bodyPr>
-            <a:normAutofit/>
-          </a:bodyPr>
-          <a:lstStyle/>
-          <a:p>
-            <a:r>
-              <a:rPr lang="en-US" sz="4800" dirty="0">
-                <a:latin typeface="Bahnschrift" panose="020B0502040204020203" pitchFamily="34" charset="0"/>
-              </a:rPr>
-              <a:t>Optimizations</a:t>
-            </a:r>
-          </a:p>
-        </p:txBody>
-      </p:sp>
-      <p:sp>
-        <p:nvSpPr>
-          <p:cNvPr id="3" name="Content Placeholder 2">
-            <a:extLst>
-              <a:ext uri="{FF2B5EF4-FFF2-40B4-BE49-F238E27FC236}">
-                <a16:creationId xmlns:a16="http://schemas.microsoft.com/office/drawing/2014/main" id="{0265484F-627C-AFCC-CC42-17B6F157CC64}"/>
-              </a:ext>
-            </a:extLst>
-          </p:cNvPr>
-          <p:cNvSpPr>
-            <a:spLocks noGrp="1"/>
-          </p:cNvSpPr>
-          <p:nvPr>
-            <p:ph idx="1"/>
-          </p:nvPr>
-        </p:nvSpPr>
-        <p:spPr/>
-        <p:txBody>
-          <a:bodyPr>
-            <a:normAutofit/>
-          </a:bodyPr>
-          <a:lstStyle/>
-          <a:p>
-            <a:endParaRPr lang="en-US" sz="2400" b="1" dirty="0">
-              <a:solidFill>
-                <a:schemeClr val="accent1"/>
-              </a:solidFill>
-              <a:latin typeface="Bahnschrift" panose="020B0502040204020203" pitchFamily="34" charset="0"/>
-            </a:endParaRPr>
-          </a:p>
-        </p:txBody>
-      </p:sp>
-    </p:spTree>
-    <p:extLst>
-      <p:ext uri="{BB962C8B-B14F-4D97-AF65-F5344CB8AC3E}">
-        <p14:creationId xmlns:p14="http://schemas.microsoft.com/office/powerpoint/2010/main" val="265293387"/>
-      </p:ext>
-    </p:extLst>
-  </p:cSld>
-  <p:clrMapOvr>
-    <a:masterClrMapping/>
-  </p:clrMapOvr>
-</p:sld>
-</file>
-
 <file path=ppt/slides/slide2.xml><?xml version="1.0" encoding="utf-8"?>
 <p:sld xmlns:a="http://schemas.openxmlformats.org/drawingml/2006/main" xmlns:r="http://schemas.openxmlformats.org/officeDocument/2006/relationships" xmlns:p="http://schemas.openxmlformats.org/presentationml/2006/main">
   <p:cSld>
@@ -4685,20 +4666,6 @@
               </a:rPr>
               <a:t>https://github.com/saada2006/MinecraftShaderProgramming</a:t>
             </a:r>
-            <a:br>
-              <a:rPr lang="en-US" sz="1600" dirty="0">
-                <a:solidFill>
-                  <a:schemeClr val="accent1"/>
-                </a:solidFill>
-                <a:latin typeface="Bahnschrift" panose="020B0502040204020203" pitchFamily="34" charset="0"/>
-              </a:rPr>
-            </a:br>
-            <a:endParaRPr lang="en-US" sz="1600" dirty="0">
-              <a:solidFill>
-                <a:schemeClr val="accent1"/>
-              </a:solidFill>
-              <a:latin typeface="Bahnschrift" panose="020B0502040204020203" pitchFamily="34" charset="0"/>
-            </a:endParaRPr>
           </a:p>
           <a:p>
             <a:r>
@@ -4995,7 +4962,7 @@
           <p:cNvPr id="2" name="Title 1">
             <a:extLst>
               <a:ext uri="{FF2B5EF4-FFF2-40B4-BE49-F238E27FC236}">
-                <a16:creationId xmlns:a16="http://schemas.microsoft.com/office/drawing/2014/main" id="{CC2A9E52-7620-C107-A500-313F73399FA8}"/>
+                <a16:creationId xmlns:a16="http://schemas.microsoft.com/office/drawing/2014/main" id="{1B7F6E6C-274F-76DF-4C34-1CA840E8C9FE}"/>
               </a:ext>
             </a:extLst>
           </p:cNvPr>
@@ -5017,7 +4984,7 @@
               <a:rPr lang="en-US" sz="4800" dirty="0">
                 <a:latin typeface="Bahnschrift" panose="020B0502040204020203" pitchFamily="34" charset="0"/>
               </a:rPr>
-              <a:t>Gameboy</a:t>
+              <a:t>World Curvature</a:t>
             </a:r>
           </a:p>
         </p:txBody>
@@ -5027,7 +4994,7 @@
           <p:cNvPr id="3" name="Picture Placeholder 2">
             <a:extLst>
               <a:ext uri="{FF2B5EF4-FFF2-40B4-BE49-F238E27FC236}">
-                <a16:creationId xmlns:a16="http://schemas.microsoft.com/office/drawing/2014/main" id="{6ECEE4F9-E888-1C79-22A9-4727251341BD}"/>
+                <a16:creationId xmlns:a16="http://schemas.microsoft.com/office/drawing/2014/main" id="{BABE8ACD-E436-C05E-7563-9FF740D092E5}"/>
               </a:ext>
             </a:extLst>
           </p:cNvPr>
@@ -5045,7 +5012,7 @@
           <p:cNvPr id="4" name="Text Placeholder 3">
             <a:extLst>
               <a:ext uri="{FF2B5EF4-FFF2-40B4-BE49-F238E27FC236}">
-                <a16:creationId xmlns:a16="http://schemas.microsoft.com/office/drawing/2014/main" id="{C70D85F6-0179-111C-857A-383CEEB49629}"/>
+                <a16:creationId xmlns:a16="http://schemas.microsoft.com/office/drawing/2014/main" id="{D443A93F-28C6-344B-CEFD-CAADE91340EB}"/>
               </a:ext>
             </a:extLst>
           </p:cNvPr>
@@ -5067,7 +5034,7 @@
               <a:rPr lang="en-US" sz="2400" dirty="0">
                 <a:latin typeface="Bahnschrift" panose="020B0502040204020203" pitchFamily="34" charset="0"/>
               </a:rPr>
-              <a:t>Made from scratch</a:t>
+              <a:t>Inspired by a setting in BSL shaders for Minecraft</a:t>
             </a:r>
           </a:p>
         </p:txBody>
@@ -5075,7 +5042,7 @@
     </p:spTree>
     <p:extLst>
       <p:ext uri="{BB962C8B-B14F-4D97-AF65-F5344CB8AC3E}">
-        <p14:creationId xmlns:p14="http://schemas.microsoft.com/office/powerpoint/2010/main" val="2644736087"/>
+        <p14:creationId xmlns:p14="http://schemas.microsoft.com/office/powerpoint/2010/main" val="1096689483"/>
       </p:ext>
     </p:extLst>
   </p:cSld>
@@ -5129,7 +5096,7 @@
               <a:rPr lang="en-US" sz="4800" dirty="0">
                 <a:latin typeface="Bahnschrift" panose="020B0502040204020203" pitchFamily="34" charset="0"/>
               </a:rPr>
-              <a:t>NES</a:t>
+              <a:t>Gameboy</a:t>
             </a:r>
           </a:p>
         </p:txBody>
@@ -5187,7 +5154,7 @@
     </p:spTree>
     <p:extLst>
       <p:ext uri="{BB962C8B-B14F-4D97-AF65-F5344CB8AC3E}">
-        <p14:creationId xmlns:p14="http://schemas.microsoft.com/office/powerpoint/2010/main" val="133502076"/>
+        <p14:creationId xmlns:p14="http://schemas.microsoft.com/office/powerpoint/2010/main" val="2644736087"/>
       </p:ext>
     </p:extLst>
   </p:cSld>
@@ -5241,7 +5208,7 @@
               <a:rPr lang="en-US" sz="4800" dirty="0">
                 <a:latin typeface="Bahnschrift" panose="020B0502040204020203" pitchFamily="34" charset="0"/>
               </a:rPr>
-              <a:t>Atari 2600 NTSC</a:t>
+              <a:t>NES</a:t>
             </a:r>
           </a:p>
         </p:txBody>
@@ -5299,7 +5266,7 @@
     </p:spTree>
     <p:extLst>
       <p:ext uri="{BB962C8B-B14F-4D97-AF65-F5344CB8AC3E}">
-        <p14:creationId xmlns:p14="http://schemas.microsoft.com/office/powerpoint/2010/main" val="1007413864"/>
+        <p14:creationId xmlns:p14="http://schemas.microsoft.com/office/powerpoint/2010/main" val="133502076"/>
       </p:ext>
     </p:extLst>
   </p:cSld>
@@ -5331,7 +5298,7 @@
           <p:cNvPr id="2" name="Title 1">
             <a:extLst>
               <a:ext uri="{FF2B5EF4-FFF2-40B4-BE49-F238E27FC236}">
-                <a16:creationId xmlns:a16="http://schemas.microsoft.com/office/drawing/2014/main" id="{100D03E8-C905-A61D-47D6-6048EBBD46A7}"/>
+                <a16:creationId xmlns:a16="http://schemas.microsoft.com/office/drawing/2014/main" id="{CC2A9E52-7620-C107-A500-313F73399FA8}"/>
               </a:ext>
             </a:extLst>
           </p:cNvPr>
@@ -5353,7 +5320,7 @@
               <a:rPr lang="en-US" sz="4800" dirty="0">
                 <a:latin typeface="Bahnschrift" panose="020B0502040204020203" pitchFamily="34" charset="0"/>
               </a:rPr>
-              <a:t>Skybox</a:t>
+              <a:t>Atari 2600 NTSC</a:t>
             </a:r>
           </a:p>
         </p:txBody>
@@ -5363,7 +5330,7 @@
           <p:cNvPr id="3" name="Picture Placeholder 2">
             <a:extLst>
               <a:ext uri="{FF2B5EF4-FFF2-40B4-BE49-F238E27FC236}">
-                <a16:creationId xmlns:a16="http://schemas.microsoft.com/office/drawing/2014/main" id="{3B164165-C1C0-33E5-EBF6-7122BAE93ABA}"/>
+                <a16:creationId xmlns:a16="http://schemas.microsoft.com/office/drawing/2014/main" id="{6ECEE4F9-E888-1C79-22A9-4727251341BD}"/>
               </a:ext>
             </a:extLst>
           </p:cNvPr>
@@ -5381,7 +5348,7 @@
           <p:cNvPr id="4" name="Text Placeholder 3">
             <a:extLst>
               <a:ext uri="{FF2B5EF4-FFF2-40B4-BE49-F238E27FC236}">
-                <a16:creationId xmlns:a16="http://schemas.microsoft.com/office/drawing/2014/main" id="{F6E741DB-83F2-61C1-EAC9-638895B89CD4}"/>
+                <a16:creationId xmlns:a16="http://schemas.microsoft.com/office/drawing/2014/main" id="{C70D85F6-0179-111C-857A-383CEEB49629}"/>
               </a:ext>
             </a:extLst>
           </p:cNvPr>
@@ -5411,7 +5378,7 @@
     </p:spTree>
     <p:extLst>
       <p:ext uri="{BB962C8B-B14F-4D97-AF65-F5344CB8AC3E}">
-        <p14:creationId xmlns:p14="http://schemas.microsoft.com/office/powerpoint/2010/main" val="3507574493"/>
+        <p14:creationId xmlns:p14="http://schemas.microsoft.com/office/powerpoint/2010/main" val="1007413864"/>
       </p:ext>
     </p:extLst>
   </p:cSld>
@@ -5443,7 +5410,7 @@
           <p:cNvPr id="2" name="Title 1">
             <a:extLst>
               <a:ext uri="{FF2B5EF4-FFF2-40B4-BE49-F238E27FC236}">
-                <a16:creationId xmlns:a16="http://schemas.microsoft.com/office/drawing/2014/main" id="{1B7F6E6C-274F-76DF-4C34-1CA840E8C9FE}"/>
+                <a16:creationId xmlns:a16="http://schemas.microsoft.com/office/drawing/2014/main" id="{ADFAB2EE-B836-0147-0A12-0DEB2F8F3B07}"/>
               </a:ext>
             </a:extLst>
           </p:cNvPr>
@@ -5465,17 +5432,17 @@
               <a:rPr lang="en-US" sz="4800" dirty="0">
                 <a:latin typeface="Bahnschrift" panose="020B0502040204020203" pitchFamily="34" charset="0"/>
               </a:rPr>
-              <a:t>World Curvature</a:t>
-            </a:r>
-          </a:p>
-        </p:txBody>
-      </p:sp>
-      <p:sp>
-        <p:nvSpPr>
-          <p:cNvPr id="3" name="Picture Placeholder 2">
+              <a:t>Optimizations</a:t>
+            </a:r>
+          </a:p>
+        </p:txBody>
+      </p:sp>
+      <p:sp>
+        <p:nvSpPr>
+          <p:cNvPr id="3" name="Content Placeholder 2">
             <a:extLst>
               <a:ext uri="{FF2B5EF4-FFF2-40B4-BE49-F238E27FC236}">
-                <a16:creationId xmlns:a16="http://schemas.microsoft.com/office/drawing/2014/main" id="{BABE8ACD-E436-C05E-7563-9FF740D092E5}"/>
+                <a16:creationId xmlns:a16="http://schemas.microsoft.com/office/drawing/2014/main" id="{0265484F-627C-AFCC-CC42-17B6F157CC64}"/>
               </a:ext>
             </a:extLst>
           </p:cNvPr>
@@ -5483,25 +5450,7 @@
             <a:spLocks noGrp="1"/>
           </p:cNvSpPr>
           <p:nvPr>
-            <p:ph type="pic" idx="1"/>
-          </p:nvPr>
-        </p:nvSpPr>
-        <p:spPr/>
-      </p:sp>
-      <p:sp>
-        <p:nvSpPr>
-          <p:cNvPr id="4" name="Text Placeholder 3">
-            <a:extLst>
-              <a:ext uri="{FF2B5EF4-FFF2-40B4-BE49-F238E27FC236}">
-                <a16:creationId xmlns:a16="http://schemas.microsoft.com/office/drawing/2014/main" id="{D443A93F-28C6-344B-CEFD-CAADE91340EB}"/>
-              </a:ext>
-            </a:extLst>
-          </p:cNvPr>
-          <p:cNvSpPr>
-            <a:spLocks noGrp="1"/>
-          </p:cNvSpPr>
-          <p:nvPr>
-            <p:ph type="body" sz="half" idx="2"/>
+            <p:ph idx="1"/>
           </p:nvPr>
         </p:nvSpPr>
         <p:spPr/>
@@ -5511,19 +5460,19 @@
           </a:bodyPr>
           <a:lstStyle/>
           <a:p>
-            <a:r>
-              <a:rPr lang="en-US" sz="2400" dirty="0">
-                <a:latin typeface="Bahnschrift" panose="020B0502040204020203" pitchFamily="34" charset="0"/>
-              </a:rPr>
-              <a:t>Inspired by a setting in BSL shaders for Minecraft</a:t>
-            </a:r>
+            <a:endParaRPr lang="en-US" sz="2400" b="1" dirty="0">
+              <a:solidFill>
+                <a:schemeClr val="accent1"/>
+              </a:solidFill>
+              <a:latin typeface="Bahnschrift" panose="020B0502040204020203" pitchFamily="34" charset="0"/>
+            </a:endParaRPr>
           </a:p>
         </p:txBody>
       </p:sp>
     </p:spTree>
     <p:extLst>
       <p:ext uri="{BB962C8B-B14F-4D97-AF65-F5344CB8AC3E}">
-        <p14:creationId xmlns:p14="http://schemas.microsoft.com/office/powerpoint/2010/main" val="1096689483"/>
+        <p14:creationId xmlns:p14="http://schemas.microsoft.com/office/powerpoint/2010/main" val="265293387"/>
       </p:ext>
     </p:extLst>
   </p:cSld>

</xml_diff>